<commit_message>
Updated the presentation with questions
</commit_message>
<xml_diff>
--- a/01_GitTutorial/HowToGit.pptx
+++ b/01_GitTutorial/HowToGit.pptx
@@ -5,7 +5,7 @@
     <p:sldMasterId id="2147483648" r:id="rId1"/>
   </p:sldMasterIdLst>
   <p:notesMasterIdLst>
-    <p:notesMasterId r:id="rId46"/>
+    <p:notesMasterId r:id="rId54"/>
   </p:notesMasterIdLst>
   <p:sldIdLst>
     <p:sldId id="285" r:id="rId2"/>
@@ -50,8 +50,16 @@
     <p:sldId id="313" r:id="rId41"/>
     <p:sldId id="314" r:id="rId42"/>
     <p:sldId id="301" r:id="rId43"/>
-    <p:sldId id="282" r:id="rId44"/>
-    <p:sldId id="302" r:id="rId45"/>
+    <p:sldId id="323" r:id="rId44"/>
+    <p:sldId id="331" r:id="rId45"/>
+    <p:sldId id="326" r:id="rId46"/>
+    <p:sldId id="324" r:id="rId47"/>
+    <p:sldId id="328" r:id="rId48"/>
+    <p:sldId id="325" r:id="rId49"/>
+    <p:sldId id="329" r:id="rId50"/>
+    <p:sldId id="330" r:id="rId51"/>
+    <p:sldId id="282" r:id="rId52"/>
+    <p:sldId id="302" r:id="rId53"/>
   </p:sldIdLst>
   <p:sldSz cx="12192000" cy="6858000"/>
   <p:notesSz cx="6858000" cy="9144000"/>
@@ -251,7 +259,7 @@
           <a:p>
             <a:fld id="{FB1A487A-BCAB-4FA9-93D5-0C8D3D81510A}" type="datetimeFigureOut">
               <a:rPr lang="en-GB" smtClean="0"/>
-              <a:t>06/01/2022</a:t>
+              <a:t>20/01/2022</a:t>
             </a:fld>
             <a:endParaRPr lang="en-GB"/>
           </a:p>
@@ -650,7 +658,7 @@
           <a:p>
             <a:fld id="{ECAF4212-6013-4BDE-BCCC-04B63E5B0D67}" type="datetimeFigureOut">
               <a:rPr lang="en-GB" smtClean="0"/>
-              <a:t>06/01/2022</a:t>
+              <a:t>20/01/2022</a:t>
             </a:fld>
             <a:endParaRPr lang="en-GB"/>
           </a:p>
@@ -820,7 +828,7 @@
           <a:p>
             <a:fld id="{ECAF4212-6013-4BDE-BCCC-04B63E5B0D67}" type="datetimeFigureOut">
               <a:rPr lang="en-GB" smtClean="0"/>
-              <a:t>06/01/2022</a:t>
+              <a:t>20/01/2022</a:t>
             </a:fld>
             <a:endParaRPr lang="en-GB"/>
           </a:p>
@@ -1000,7 +1008,7 @@
           <a:p>
             <a:fld id="{ECAF4212-6013-4BDE-BCCC-04B63E5B0D67}" type="datetimeFigureOut">
               <a:rPr lang="en-GB" smtClean="0"/>
-              <a:t>06/01/2022</a:t>
+              <a:t>20/01/2022</a:t>
             </a:fld>
             <a:endParaRPr lang="en-GB"/>
           </a:p>
@@ -1170,7 +1178,7 @@
           <a:p>
             <a:fld id="{ECAF4212-6013-4BDE-BCCC-04B63E5B0D67}" type="datetimeFigureOut">
               <a:rPr lang="en-GB" smtClean="0"/>
-              <a:t>06/01/2022</a:t>
+              <a:t>20/01/2022</a:t>
             </a:fld>
             <a:endParaRPr lang="en-GB"/>
           </a:p>
@@ -1416,7 +1424,7 @@
           <a:p>
             <a:fld id="{ECAF4212-6013-4BDE-BCCC-04B63E5B0D67}" type="datetimeFigureOut">
               <a:rPr lang="en-GB" smtClean="0"/>
-              <a:t>06/01/2022</a:t>
+              <a:t>20/01/2022</a:t>
             </a:fld>
             <a:endParaRPr lang="en-GB"/>
           </a:p>
@@ -1648,7 +1656,7 @@
           <a:p>
             <a:fld id="{ECAF4212-6013-4BDE-BCCC-04B63E5B0D67}" type="datetimeFigureOut">
               <a:rPr lang="en-GB" smtClean="0"/>
-              <a:t>06/01/2022</a:t>
+              <a:t>20/01/2022</a:t>
             </a:fld>
             <a:endParaRPr lang="en-GB"/>
           </a:p>
@@ -2015,7 +2023,7 @@
           <a:p>
             <a:fld id="{ECAF4212-6013-4BDE-BCCC-04B63E5B0D67}" type="datetimeFigureOut">
               <a:rPr lang="en-GB" smtClean="0"/>
-              <a:t>06/01/2022</a:t>
+              <a:t>20/01/2022</a:t>
             </a:fld>
             <a:endParaRPr lang="en-GB"/>
           </a:p>
@@ -2133,7 +2141,7 @@
           <a:p>
             <a:fld id="{ECAF4212-6013-4BDE-BCCC-04B63E5B0D67}" type="datetimeFigureOut">
               <a:rPr lang="en-GB" smtClean="0"/>
-              <a:t>06/01/2022</a:t>
+              <a:t>20/01/2022</a:t>
             </a:fld>
             <a:endParaRPr lang="en-GB"/>
           </a:p>
@@ -2228,7 +2236,7 @@
           <a:p>
             <a:fld id="{ECAF4212-6013-4BDE-BCCC-04B63E5B0D67}" type="datetimeFigureOut">
               <a:rPr lang="en-GB" smtClean="0"/>
-              <a:t>06/01/2022</a:t>
+              <a:t>20/01/2022</a:t>
             </a:fld>
             <a:endParaRPr lang="en-GB"/>
           </a:p>
@@ -2505,7 +2513,7 @@
           <a:p>
             <a:fld id="{ECAF4212-6013-4BDE-BCCC-04B63E5B0D67}" type="datetimeFigureOut">
               <a:rPr lang="en-GB" smtClean="0"/>
-              <a:t>06/01/2022</a:t>
+              <a:t>20/01/2022</a:t>
             </a:fld>
             <a:endParaRPr lang="en-GB"/>
           </a:p>
@@ -2758,7 +2766,7 @@
           <a:p>
             <a:fld id="{ECAF4212-6013-4BDE-BCCC-04B63E5B0D67}" type="datetimeFigureOut">
               <a:rPr lang="en-GB" smtClean="0"/>
-              <a:t>06/01/2022</a:t>
+              <a:t>20/01/2022</a:t>
             </a:fld>
             <a:endParaRPr lang="en-GB"/>
           </a:p>
@@ -2971,7 +2979,7 @@
           <a:p>
             <a:fld id="{ECAF4212-6013-4BDE-BCCC-04B63E5B0D67}" type="datetimeFigureOut">
               <a:rPr lang="en-GB" smtClean="0"/>
-              <a:t>06/01/2022</a:t>
+              <a:t>20/01/2022</a:t>
             </a:fld>
             <a:endParaRPr lang="en-GB"/>
           </a:p>
@@ -7644,15 +7652,7 @@
           <a:p>
             <a:r>
               <a:rPr lang="en-US" dirty="0" smtClean="0"/>
-              <a:t>Sixth </a:t>
-            </a:r>
-            <a:r>
-              <a:rPr lang="en-US" dirty="0" smtClean="0"/>
-              <a:t>commit, </a:t>
-            </a:r>
-            <a:r>
-              <a:rPr lang="en-US" dirty="0" smtClean="0"/>
-              <a:t>where we merge</a:t>
+              <a:t>Sixth commit, where we merge</a:t>
             </a:r>
             <a:endParaRPr lang="en-GB" dirty="0"/>
           </a:p>
@@ -9359,11 +9359,7 @@
             </a:r>
             <a:r>
               <a:rPr lang="en-US" dirty="0" smtClean="0"/>
-              <a:t> </a:t>
-            </a:r>
-            <a:r>
-              <a:rPr lang="en-US" dirty="0" smtClean="0"/>
-              <a:t>taken </a:t>
+              <a:t> taken </a:t>
             </a:r>
             <a:r>
               <a:rPr lang="en-US" dirty="0"/>
@@ -9371,11 +9367,7 @@
             </a:r>
             <a:r>
               <a:rPr lang="en-US" dirty="0" smtClean="0"/>
-              <a:t>to</a:t>
-            </a:r>
-            <a:r>
-              <a:rPr lang="en-US" dirty="0" smtClean="0"/>
-              <a:t> </a:t>
+              <a:t>to </a:t>
             </a:r>
             <a:r>
               <a:rPr lang="en-US" dirty="0"/>
@@ -9486,13 +9478,8 @@
           <a:p>
             <a:r>
               <a:rPr lang="en-US" dirty="0" smtClean="0"/>
-              <a:t>Add </a:t>
-            </a:r>
-            <a:r>
-              <a:rPr lang="en-US" dirty="0" smtClean="0"/>
-              <a:t>a license</a:t>
-            </a:r>
-            <a:endParaRPr lang="en-US" dirty="0" smtClean="0"/>
+              <a:t>Add a license</a:t>
+            </a:r>
           </a:p>
           <a:p>
             <a:r>
@@ -10297,6 +10284,1700 @@
       </p:grpSpPr>
       <p:sp>
         <p:nvSpPr>
+          <p:cNvPr id="2" name="Nadpis 1"/>
+          <p:cNvSpPr>
+            <a:spLocks noGrp="1"/>
+          </p:cNvSpPr>
+          <p:nvPr>
+            <p:ph type="title"/>
+          </p:nvPr>
+        </p:nvSpPr>
+        <p:spPr/>
+        <p:txBody>
+          <a:bodyPr/>
+          <a:lstStyle/>
+          <a:p>
+            <a:r>
+              <a:rPr lang="en-US" dirty="0" smtClean="0"/>
+              <a:t>Questions</a:t>
+            </a:r>
+            <a:endParaRPr lang="en-GB" dirty="0"/>
+          </a:p>
+        </p:txBody>
+      </p:sp>
+      <p:sp>
+        <p:nvSpPr>
+          <p:cNvPr id="4" name="Zástupný symbol pro text 3"/>
+          <p:cNvSpPr>
+            <a:spLocks noGrp="1"/>
+          </p:cNvSpPr>
+          <p:nvPr>
+            <p:ph type="body" idx="1"/>
+          </p:nvPr>
+        </p:nvSpPr>
+        <p:spPr/>
+        <p:txBody>
+          <a:bodyPr/>
+          <a:lstStyle/>
+          <a:p>
+            <a:endParaRPr lang="en-GB"/>
+          </a:p>
+        </p:txBody>
+      </p:sp>
+    </p:spTree>
+    <p:extLst>
+      <p:ext uri="{BB962C8B-B14F-4D97-AF65-F5344CB8AC3E}">
+        <p14:creationId xmlns:p14="http://schemas.microsoft.com/office/powerpoint/2010/main" val="2962524222"/>
+      </p:ext>
+    </p:extLst>
+  </p:cSld>
+  <p:clrMapOvr>
+    <a:masterClrMapping/>
+  </p:clrMapOvr>
+</p:sld>
+</file>
+
+<file path=ppt/slides/slide44.xml><?xml version="1.0" encoding="utf-8"?>
+<p:sld xmlns:a="http://schemas.openxmlformats.org/drawingml/2006/main" xmlns:r="http://schemas.openxmlformats.org/officeDocument/2006/relationships" xmlns:p="http://schemas.openxmlformats.org/presentationml/2006/main">
+  <p:cSld>
+    <p:spTree>
+      <p:nvGrpSpPr>
+        <p:cNvPr id="1" name=""/>
+        <p:cNvGrpSpPr/>
+        <p:nvPr/>
+      </p:nvGrpSpPr>
+      <p:grpSpPr>
+        <a:xfrm>
+          <a:off x="0" y="0"/>
+          <a:ext cx="0" cy="0"/>
+          <a:chOff x="0" y="0"/>
+          <a:chExt cx="0" cy="0"/>
+        </a:xfrm>
+      </p:grpSpPr>
+      <p:sp>
+        <p:nvSpPr>
+          <p:cNvPr id="2" name="Nadpis 1"/>
+          <p:cNvSpPr>
+            <a:spLocks noGrp="1"/>
+          </p:cNvSpPr>
+          <p:nvPr>
+            <p:ph type="title"/>
+          </p:nvPr>
+        </p:nvSpPr>
+        <p:spPr/>
+        <p:txBody>
+          <a:bodyPr/>
+          <a:lstStyle/>
+          <a:p>
+            <a:r>
+              <a:rPr lang="en-US" dirty="0" smtClean="0"/>
+              <a:t>Hidden message</a:t>
+            </a:r>
+            <a:endParaRPr lang="en-GB" dirty="0"/>
+          </a:p>
+        </p:txBody>
+      </p:sp>
+      <p:sp>
+        <p:nvSpPr>
+          <p:cNvPr id="3" name="Zástupný symbol pro obsah 2"/>
+          <p:cNvSpPr>
+            <a:spLocks noGrp="1"/>
+          </p:cNvSpPr>
+          <p:nvPr>
+            <p:ph idx="1"/>
+          </p:nvPr>
+        </p:nvSpPr>
+        <p:spPr>
+          <a:xfrm>
+            <a:off x="838200" y="1825625"/>
+            <a:ext cx="3782786" cy="4351338"/>
+          </a:xfrm>
+        </p:spPr>
+        <p:txBody>
+          <a:bodyPr>
+            <a:normAutofit lnSpcReduction="10000"/>
+          </a:bodyPr>
+          <a:lstStyle/>
+          <a:p>
+            <a:r>
+              <a:rPr lang="en-US" dirty="0" smtClean="0"/>
+              <a:t>See commit history or file blame</a:t>
+            </a:r>
+          </a:p>
+          <a:p>
+            <a:endParaRPr lang="en-US" dirty="0"/>
+          </a:p>
+          <a:p>
+            <a:r>
+              <a:rPr lang="en-US" dirty="0" smtClean="0"/>
+              <a:t>Takeaway: Everything that you commit and push CAN be found.</a:t>
+            </a:r>
+          </a:p>
+          <a:p>
+            <a:r>
+              <a:rPr lang="en-US" dirty="0" smtClean="0"/>
+              <a:t>No need to be afraid of mistakes</a:t>
+            </a:r>
+          </a:p>
+          <a:p>
+            <a:r>
+              <a:rPr lang="en-US" dirty="0" smtClean="0"/>
+              <a:t>but be careful with any secret / private data!</a:t>
+            </a:r>
+            <a:endParaRPr lang="en-GB" dirty="0"/>
+          </a:p>
+        </p:txBody>
+      </p:sp>
+      <p:pic>
+        <p:nvPicPr>
+          <p:cNvPr id="4" name="Obrázek 3"/>
+          <p:cNvPicPr>
+            <a:picLocks noChangeAspect="1"/>
+          </p:cNvPicPr>
+          <p:nvPr/>
+        </p:nvPicPr>
+        <p:blipFill>
+          <a:blip r:embed="rId2"/>
+          <a:stretch>
+            <a:fillRect/>
+          </a:stretch>
+        </p:blipFill>
+        <p:spPr>
+          <a:xfrm>
+            <a:off x="6083576" y="2686049"/>
+            <a:ext cx="6108424" cy="4082143"/>
+          </a:xfrm>
+          <a:prstGeom prst="rect">
+            <a:avLst/>
+          </a:prstGeom>
+        </p:spPr>
+      </p:pic>
+    </p:spTree>
+    <p:extLst>
+      <p:ext uri="{BB962C8B-B14F-4D97-AF65-F5344CB8AC3E}">
+        <p14:creationId xmlns:p14="http://schemas.microsoft.com/office/powerpoint/2010/main" val="1334755160"/>
+      </p:ext>
+    </p:extLst>
+  </p:cSld>
+  <p:clrMapOvr>
+    <a:masterClrMapping/>
+  </p:clrMapOvr>
+</p:sld>
+</file>
+
+<file path=ppt/slides/slide45.xml><?xml version="1.0" encoding="utf-8"?>
+<p:sld xmlns:a="http://schemas.openxmlformats.org/drawingml/2006/main" xmlns:r="http://schemas.openxmlformats.org/officeDocument/2006/relationships" xmlns:p="http://schemas.openxmlformats.org/presentationml/2006/main">
+  <p:cSld>
+    <p:spTree>
+      <p:nvGrpSpPr>
+        <p:cNvPr id="1" name=""/>
+        <p:cNvGrpSpPr/>
+        <p:nvPr/>
+      </p:nvGrpSpPr>
+      <p:grpSpPr>
+        <a:xfrm>
+          <a:off x="0" y="0"/>
+          <a:ext cx="0" cy="0"/>
+          <a:chOff x="0" y="0"/>
+          <a:chExt cx="0" cy="0"/>
+        </a:xfrm>
+      </p:grpSpPr>
+      <p:sp>
+        <p:nvSpPr>
+          <p:cNvPr id="2" name="Nadpis 1"/>
+          <p:cNvSpPr>
+            <a:spLocks noGrp="1"/>
+          </p:cNvSpPr>
+          <p:nvPr>
+            <p:ph type="title"/>
+          </p:nvPr>
+        </p:nvSpPr>
+        <p:spPr/>
+        <p:txBody>
+          <a:bodyPr/>
+          <a:lstStyle/>
+          <a:p>
+            <a:r>
+              <a:rPr lang="en-US" dirty="0" smtClean="0"/>
+              <a:t>Merging and Conflicts</a:t>
+            </a:r>
+            <a:endParaRPr lang="en-GB" dirty="0"/>
+          </a:p>
+        </p:txBody>
+      </p:sp>
+      <p:sp>
+        <p:nvSpPr>
+          <p:cNvPr id="3" name="Zástupný symbol pro obsah 2"/>
+          <p:cNvSpPr>
+            <a:spLocks noGrp="1"/>
+          </p:cNvSpPr>
+          <p:nvPr>
+            <p:ph idx="1"/>
+          </p:nvPr>
+        </p:nvSpPr>
+        <p:spPr/>
+        <p:txBody>
+          <a:bodyPr>
+            <a:normAutofit fontScale="62500" lnSpcReduction="20000"/>
+          </a:bodyPr>
+          <a:lstStyle/>
+          <a:p>
+            <a:r>
+              <a:rPr lang="en-US" dirty="0" smtClean="0"/>
+              <a:t>If </a:t>
+            </a:r>
+            <a:r>
+              <a:rPr lang="en-US" dirty="0"/>
+              <a:t>you make a branch and are working on adding a section of code in the middle of your original code and you want to merge, will you have a merge error? Or is there a way to shift down lines of you original code? That way your new code will be inserted in the proper location without replacing any original code.</a:t>
+            </a:r>
+          </a:p>
+          <a:p>
+            <a:pPr lvl="1"/>
+            <a:r>
+              <a:rPr lang="en-US" dirty="0" smtClean="0"/>
+              <a:t>I </a:t>
+            </a:r>
+            <a:r>
+              <a:rPr lang="en-US" dirty="0"/>
+              <a:t>was demonstrating just an edge case, where we were editing the same line, thus the </a:t>
+            </a:r>
+            <a:r>
+              <a:rPr lang="en-US" dirty="0" err="1"/>
+              <a:t>Git</a:t>
+            </a:r>
+            <a:r>
+              <a:rPr lang="en-US" dirty="0"/>
+              <a:t> cant really decide what is better. But for a simple additions </a:t>
+            </a:r>
+            <a:r>
+              <a:rPr lang="en-US" dirty="0" err="1"/>
+              <a:t>inbetween</a:t>
+            </a:r>
+            <a:r>
+              <a:rPr lang="en-US" dirty="0"/>
+              <a:t> existing codes, the </a:t>
+            </a:r>
+            <a:r>
+              <a:rPr lang="en-US" dirty="0" err="1"/>
+              <a:t>Git</a:t>
+            </a:r>
+            <a:r>
+              <a:rPr lang="en-US" dirty="0"/>
+              <a:t> merges automatically.</a:t>
+            </a:r>
+          </a:p>
+          <a:p>
+            <a:r>
+              <a:rPr lang="en-US" dirty="0"/>
+              <a:t>sometimes it shows ”conflict” and couldn’t merge. What kind of things are conflicted to each other?</a:t>
+            </a:r>
+          </a:p>
+          <a:p>
+            <a:pPr lvl="1"/>
+            <a:r>
+              <a:rPr lang="en-US" dirty="0" smtClean="0"/>
+              <a:t>Conflict may </a:t>
+            </a:r>
+            <a:r>
+              <a:rPr lang="en-US" dirty="0"/>
+              <a:t>happen during merging branches, when it can't be resolved automatically, that is when the same line has been edited on both branches and </a:t>
+            </a:r>
+            <a:r>
+              <a:rPr lang="en-US" dirty="0" err="1"/>
+              <a:t>Git</a:t>
+            </a:r>
+            <a:r>
+              <a:rPr lang="en-US" dirty="0"/>
+              <a:t> can't decide what should be kept. Otherwise all simple additions and deletes are applied (merged automatically). When files are conflicted, we have to resolve the conflicts before </a:t>
+            </a:r>
+            <a:r>
+              <a:rPr lang="en-US" dirty="0" err="1"/>
+              <a:t>copmleting</a:t>
+            </a:r>
+            <a:r>
+              <a:rPr lang="en-US" dirty="0"/>
+              <a:t> the merge. So, you could merge conflicts, you just have to oversee the operation and help the </a:t>
+            </a:r>
+            <a:r>
+              <a:rPr lang="en-US" dirty="0" err="1"/>
+              <a:t>Git</a:t>
+            </a:r>
+            <a:r>
+              <a:rPr lang="en-US" dirty="0"/>
+              <a:t> a bit</a:t>
+            </a:r>
+            <a:r>
+              <a:rPr lang="en-US" dirty="0" smtClean="0"/>
+              <a:t>.</a:t>
+            </a:r>
+            <a:endParaRPr lang="en-US" dirty="0"/>
+          </a:p>
+          <a:p>
+            <a:r>
+              <a:rPr lang="en-US" dirty="0" smtClean="0"/>
+              <a:t>Is </a:t>
+            </a:r>
+            <a:r>
+              <a:rPr lang="en-US" dirty="0"/>
+              <a:t>there a way to make sure that no one else is working on the same file as you to avoid a merge error</a:t>
+            </a:r>
+            <a:r>
+              <a:rPr lang="en-US" dirty="0" smtClean="0"/>
+              <a:t>?</a:t>
+            </a:r>
+          </a:p>
+          <a:p>
+            <a:pPr lvl="1"/>
+            <a:r>
+              <a:rPr lang="en-US" dirty="0" smtClean="0"/>
+              <a:t>No </a:t>
+            </a:r>
+            <a:r>
+              <a:rPr lang="en-US" dirty="0"/>
+              <a:t>tools will ever eradicate the need to communicate within the team</a:t>
+            </a:r>
+            <a:r>
+              <a:rPr lang="en-US" dirty="0" smtClean="0"/>
+              <a:t>.</a:t>
+            </a:r>
+          </a:p>
+          <a:p>
+            <a:pPr lvl="2"/>
+            <a:r>
+              <a:rPr lang="en-US" dirty="0" smtClean="0"/>
+              <a:t>make </a:t>
+            </a:r>
+            <a:r>
+              <a:rPr lang="en-US" dirty="0"/>
+              <a:t>sure you commit and push as often as possible. Thus, your </a:t>
+            </a:r>
+            <a:r>
+              <a:rPr lang="en-US" dirty="0" err="1"/>
+              <a:t>collague</a:t>
+            </a:r>
+            <a:r>
+              <a:rPr lang="en-US" dirty="0"/>
+              <a:t> would have a most up-to date version, avoiding </a:t>
+            </a:r>
+            <a:r>
+              <a:rPr lang="en-US" dirty="0" smtClean="0"/>
+              <a:t>conflicts.</a:t>
+            </a:r>
+            <a:endParaRPr lang="en-US" dirty="0"/>
+          </a:p>
+          <a:p>
+            <a:pPr lvl="2"/>
+            <a:r>
+              <a:rPr lang="en-US" dirty="0" smtClean="0"/>
+              <a:t>Split </a:t>
+            </a:r>
+            <a:r>
+              <a:rPr lang="en-US" dirty="0"/>
+              <a:t>up the work, so it is not probable to overlap and </a:t>
+            </a:r>
+            <a:r>
+              <a:rPr lang="en-US" dirty="0" smtClean="0"/>
+              <a:t>finally,</a:t>
+            </a:r>
+          </a:p>
+          <a:p>
+            <a:pPr lvl="2"/>
+            <a:r>
+              <a:rPr lang="en-US" dirty="0" smtClean="0"/>
+              <a:t>do </a:t>
+            </a:r>
+            <a:r>
+              <a:rPr lang="en-US" dirty="0"/>
+              <a:t>not be afraid of </a:t>
+            </a:r>
+            <a:r>
+              <a:rPr lang="en-US" dirty="0" smtClean="0"/>
+              <a:t>conflicts</a:t>
+            </a:r>
+          </a:p>
+        </p:txBody>
+      </p:sp>
+    </p:spTree>
+    <p:extLst>
+      <p:ext uri="{BB962C8B-B14F-4D97-AF65-F5344CB8AC3E}">
+        <p14:creationId xmlns:p14="http://schemas.microsoft.com/office/powerpoint/2010/main" val="2691040510"/>
+      </p:ext>
+    </p:extLst>
+  </p:cSld>
+  <p:clrMapOvr>
+    <a:masterClrMapping/>
+  </p:clrMapOvr>
+</p:sld>
+</file>
+
+<file path=ppt/slides/slide46.xml><?xml version="1.0" encoding="utf-8"?>
+<p:sld xmlns:a="http://schemas.openxmlformats.org/drawingml/2006/main" xmlns:r="http://schemas.openxmlformats.org/officeDocument/2006/relationships" xmlns:p="http://schemas.openxmlformats.org/presentationml/2006/main">
+  <p:cSld>
+    <p:spTree>
+      <p:nvGrpSpPr>
+        <p:cNvPr id="1" name=""/>
+        <p:cNvGrpSpPr/>
+        <p:nvPr/>
+      </p:nvGrpSpPr>
+      <p:grpSpPr>
+        <a:xfrm>
+          <a:off x="0" y="0"/>
+          <a:ext cx="0" cy="0"/>
+          <a:chOff x="0" y="0"/>
+          <a:chExt cx="0" cy="0"/>
+        </a:xfrm>
+      </p:grpSpPr>
+      <p:sp>
+        <p:nvSpPr>
+          <p:cNvPr id="6" name="Nadpis 5"/>
+          <p:cNvSpPr>
+            <a:spLocks noGrp="1"/>
+          </p:cNvSpPr>
+          <p:nvPr>
+            <p:ph type="title"/>
+          </p:nvPr>
+        </p:nvSpPr>
+        <p:spPr/>
+        <p:txBody>
+          <a:bodyPr/>
+          <a:lstStyle/>
+          <a:p>
+            <a:r>
+              <a:rPr lang="en-US" dirty="0" err="1" smtClean="0"/>
+              <a:t>Git</a:t>
+            </a:r>
+            <a:r>
+              <a:rPr lang="en-US" dirty="0" smtClean="0"/>
+              <a:t> tooling</a:t>
+            </a:r>
+            <a:endParaRPr lang="en-GB" dirty="0"/>
+          </a:p>
+        </p:txBody>
+      </p:sp>
+      <p:sp>
+        <p:nvSpPr>
+          <p:cNvPr id="7" name="Zástupný symbol pro obsah 6"/>
+          <p:cNvSpPr>
+            <a:spLocks noGrp="1"/>
+          </p:cNvSpPr>
+          <p:nvPr>
+            <p:ph idx="1"/>
+          </p:nvPr>
+        </p:nvSpPr>
+        <p:spPr/>
+        <p:txBody>
+          <a:bodyPr>
+            <a:normAutofit fontScale="62500" lnSpcReduction="20000"/>
+          </a:bodyPr>
+          <a:lstStyle/>
+          <a:p>
+            <a:r>
+              <a:rPr lang="en-US" dirty="0" smtClean="0"/>
+              <a:t>Do </a:t>
+            </a:r>
+            <a:r>
+              <a:rPr lang="en-US" dirty="0"/>
+              <a:t>we have to edit files that we save in our directory or can we make changes straight from our </a:t>
+            </a:r>
+            <a:r>
+              <a:rPr lang="en-US" dirty="0" err="1"/>
+              <a:t>github</a:t>
+            </a:r>
+            <a:r>
+              <a:rPr lang="en-US" dirty="0"/>
+              <a:t> account</a:t>
+            </a:r>
+            <a:r>
+              <a:rPr lang="en-US" dirty="0" smtClean="0"/>
+              <a:t>?</a:t>
+            </a:r>
+          </a:p>
+          <a:p>
+            <a:pPr lvl="1"/>
+            <a:r>
+              <a:rPr lang="en-US" dirty="0" smtClean="0"/>
+              <a:t>Actually, </a:t>
+            </a:r>
+            <a:r>
+              <a:rPr lang="en-US" dirty="0"/>
+              <a:t>both is possible. To make some simple edits to e.g. readme file, it is totally fine to use the web interface. However, if you are programming python or </a:t>
+            </a:r>
+            <a:r>
+              <a:rPr lang="en-US" dirty="0" err="1"/>
+              <a:t>matlab</a:t>
+            </a:r>
+            <a:r>
+              <a:rPr lang="en-US" dirty="0"/>
+              <a:t>, and you already should be, you better use your local folder. This way you can see all your changes in the staging window, ready to commit (or roll back). Uploading your files from time to time is definitely not recommended (although better than nothing I guess). If you made some changes through github.com though, your </a:t>
+            </a:r>
+            <a:r>
+              <a:rPr lang="en-US" dirty="0" err="1"/>
+              <a:t>Git</a:t>
+            </a:r>
+            <a:r>
+              <a:rPr lang="en-US" dirty="0"/>
+              <a:t> client wont allow to **push** </a:t>
+            </a:r>
+            <a:r>
+              <a:rPr lang="en-US" dirty="0" err="1"/>
+              <a:t>untill</a:t>
+            </a:r>
+            <a:r>
+              <a:rPr lang="en-US" dirty="0"/>
+              <a:t> you **pull** all newer </a:t>
+            </a:r>
+            <a:r>
+              <a:rPr lang="en-US" dirty="0" smtClean="0"/>
+              <a:t>changes </a:t>
+            </a:r>
+            <a:r>
+              <a:rPr lang="en-US" dirty="0"/>
+              <a:t>back to your local repository. This way it prevents any potential conflicts in the remote repository</a:t>
+            </a:r>
+            <a:r>
+              <a:rPr lang="en-US" dirty="0" smtClean="0"/>
+              <a:t>.</a:t>
+            </a:r>
+          </a:p>
+          <a:p>
+            <a:r>
+              <a:rPr lang="en-US" dirty="0" smtClean="0"/>
+              <a:t>What </a:t>
+            </a:r>
+            <a:r>
+              <a:rPr lang="en-US" dirty="0"/>
+              <a:t>is the name for the subject that stores many repos together? For example, in the </a:t>
+            </a:r>
+            <a:r>
+              <a:rPr lang="en-US" dirty="0" err="1"/>
+              <a:t>github</a:t>
+            </a:r>
+            <a:r>
+              <a:rPr lang="en-US" dirty="0"/>
+              <a:t> for the R package </a:t>
+            </a:r>
+            <a:r>
+              <a:rPr lang="en-US" dirty="0" err="1"/>
+              <a:t>tidyverse</a:t>
+            </a:r>
+            <a:r>
+              <a:rPr lang="en-US" dirty="0"/>
+              <a:t>, https://github.com/tidyverse, there are many repos belong to this page. Is this page a repo itself</a:t>
+            </a:r>
+            <a:r>
+              <a:rPr lang="en-US" dirty="0" smtClean="0"/>
+              <a:t>?</a:t>
+            </a:r>
+          </a:p>
+          <a:p>
+            <a:pPr lvl="1"/>
+            <a:r>
+              <a:rPr lang="en-US" dirty="0" smtClean="0"/>
+              <a:t>it </a:t>
+            </a:r>
+            <a:r>
+              <a:rPr lang="en-US" dirty="0"/>
+              <a:t>is called organization. Organization could have a number of public or private repositories, similar to what an individual could have. See the difference in beards-lab: It unifies the collective effort under one brand, the commits are done by individuals (the team) though. You could have unlimited team members here so everyone could write access any of organizational repositories (or a subset of), as long as the organization and its repositories are public. For private repositories and organization you have to start paying to </a:t>
+            </a:r>
+            <a:r>
+              <a:rPr lang="en-US" dirty="0" smtClean="0"/>
+              <a:t>GitHub</a:t>
+            </a:r>
+          </a:p>
+          <a:p>
+            <a:r>
+              <a:rPr lang="en-US" dirty="0"/>
+              <a:t>for an average programmer, how much GitHub </a:t>
+            </a:r>
+            <a:r>
+              <a:rPr lang="en-US" dirty="0" err="1"/>
+              <a:t>expeirnce</a:t>
+            </a:r>
+            <a:r>
+              <a:rPr lang="en-US" dirty="0"/>
+              <a:t> do I need</a:t>
+            </a:r>
+            <a:r>
+              <a:rPr lang="en-US" dirty="0" smtClean="0"/>
+              <a:t>?</a:t>
+            </a:r>
+          </a:p>
+          <a:p>
+            <a:pPr lvl="1"/>
+            <a:r>
+              <a:rPr lang="en-US" dirty="0" smtClean="0"/>
+              <a:t>The </a:t>
+            </a:r>
+            <a:r>
+              <a:rPr lang="en-US" dirty="0"/>
+              <a:t>more the better :) Start using it on regular basis. Committing everyday, rolling back every week, being able to get a previous version, branching or merging once a month and doing some serious complicated operation once a year would take </a:t>
+            </a:r>
+            <a:r>
+              <a:rPr lang="en-US" dirty="0" err="1"/>
+              <a:t>imho</a:t>
+            </a:r>
+            <a:r>
+              <a:rPr lang="en-US" dirty="0"/>
+              <a:t> five years to get you fully professional. Concentrate on doing your job and use </a:t>
+            </a:r>
+            <a:r>
+              <a:rPr lang="en-US" dirty="0" err="1"/>
+              <a:t>git</a:t>
+            </a:r>
+            <a:r>
+              <a:rPr lang="en-US" dirty="0"/>
+              <a:t> just as you use an elevator - you usually just need to go to your fifth floor and back, </a:t>
+            </a:r>
+            <a:r>
+              <a:rPr lang="en-US" dirty="0" err="1"/>
+              <a:t>thats</a:t>
+            </a:r>
+            <a:r>
+              <a:rPr lang="en-US" dirty="0"/>
+              <a:t> about it. But if you are moving furniture, it comes really handy and I am pretty confident you will find a way when the need arises</a:t>
+            </a:r>
+            <a:r>
+              <a:rPr lang="en-US" dirty="0" smtClean="0"/>
+              <a:t>.</a:t>
+            </a:r>
+            <a:endParaRPr lang="en-GB" dirty="0"/>
+          </a:p>
+        </p:txBody>
+      </p:sp>
+    </p:spTree>
+    <p:extLst>
+      <p:ext uri="{BB962C8B-B14F-4D97-AF65-F5344CB8AC3E}">
+        <p14:creationId xmlns:p14="http://schemas.microsoft.com/office/powerpoint/2010/main" val="668270939"/>
+      </p:ext>
+    </p:extLst>
+  </p:cSld>
+  <p:clrMapOvr>
+    <a:masterClrMapping/>
+  </p:clrMapOvr>
+</p:sld>
+</file>
+
+<file path=ppt/slides/slide47.xml><?xml version="1.0" encoding="utf-8"?>
+<p:sld xmlns:a="http://schemas.openxmlformats.org/drawingml/2006/main" xmlns:r="http://schemas.openxmlformats.org/officeDocument/2006/relationships" xmlns:p="http://schemas.openxmlformats.org/presentationml/2006/main">
+  <p:cSld>
+    <p:spTree>
+      <p:nvGrpSpPr>
+        <p:cNvPr id="1" name=""/>
+        <p:cNvGrpSpPr/>
+        <p:nvPr/>
+      </p:nvGrpSpPr>
+      <p:grpSpPr>
+        <a:xfrm>
+          <a:off x="0" y="0"/>
+          <a:ext cx="0" cy="0"/>
+          <a:chOff x="0" y="0"/>
+          <a:chExt cx="0" cy="0"/>
+        </a:xfrm>
+      </p:grpSpPr>
+      <p:sp>
+        <p:nvSpPr>
+          <p:cNvPr id="2" name="Nadpis 1"/>
+          <p:cNvSpPr>
+            <a:spLocks noGrp="1"/>
+          </p:cNvSpPr>
+          <p:nvPr>
+            <p:ph type="title"/>
+          </p:nvPr>
+        </p:nvSpPr>
+        <p:spPr/>
+        <p:txBody>
+          <a:bodyPr/>
+          <a:lstStyle/>
+          <a:p>
+            <a:r>
+              <a:rPr lang="en-US" dirty="0" smtClean="0"/>
+              <a:t>.</a:t>
+            </a:r>
+            <a:r>
+              <a:rPr lang="en-US" dirty="0" err="1" smtClean="0"/>
+              <a:t>GitIgnore</a:t>
+            </a:r>
+            <a:endParaRPr lang="en-GB" dirty="0"/>
+          </a:p>
+        </p:txBody>
+      </p:sp>
+      <p:sp>
+        <p:nvSpPr>
+          <p:cNvPr id="3" name="Zástupný symbol pro obsah 2"/>
+          <p:cNvSpPr>
+            <a:spLocks noGrp="1"/>
+          </p:cNvSpPr>
+          <p:nvPr>
+            <p:ph idx="1"/>
+          </p:nvPr>
+        </p:nvSpPr>
+        <p:spPr/>
+        <p:txBody>
+          <a:bodyPr/>
+          <a:lstStyle/>
+          <a:p>
+            <a:r>
+              <a:rPr lang="en-US" dirty="0"/>
+              <a:t>I am using </a:t>
+            </a:r>
+            <a:r>
+              <a:rPr lang="en-US" dirty="0" err="1"/>
+              <a:t>MacOS</a:t>
+            </a:r>
+            <a:r>
+              <a:rPr lang="en-US" dirty="0"/>
+              <a:t>, is there any way to get rid of the .</a:t>
+            </a:r>
+            <a:r>
+              <a:rPr lang="en-US" dirty="0" err="1"/>
+              <a:t>DS_store</a:t>
+            </a:r>
+            <a:r>
+              <a:rPr lang="en-US" dirty="0"/>
+              <a:t> file that persists in my 'changes' to commit? I have already chosen to send it to the .</a:t>
+            </a:r>
+            <a:r>
+              <a:rPr lang="en-US" dirty="0" err="1"/>
+              <a:t>gitignore</a:t>
+            </a:r>
+            <a:r>
+              <a:rPr lang="en-US" dirty="0"/>
+              <a:t> file, but it did not fix the problem</a:t>
+            </a:r>
+            <a:r>
+              <a:rPr lang="en-US" dirty="0" smtClean="0"/>
+              <a:t>.</a:t>
+            </a:r>
+          </a:p>
+          <a:p>
+            <a:pPr lvl="1"/>
+            <a:r>
+              <a:rPr lang="en-US" dirty="0"/>
+              <a:t>- adding .</a:t>
+            </a:r>
+            <a:r>
+              <a:rPr lang="en-US" dirty="0" err="1"/>
+              <a:t>DS_store</a:t>
+            </a:r>
+            <a:r>
+              <a:rPr lang="en-US" dirty="0"/>
+              <a:t> into .</a:t>
+            </a:r>
+            <a:r>
+              <a:rPr lang="en-US" dirty="0" err="1"/>
+              <a:t>gitignore</a:t>
+            </a:r>
+            <a:r>
+              <a:rPr lang="en-US" dirty="0"/>
+              <a:t> should do the trick. I have just updated the .</a:t>
+            </a:r>
+            <a:r>
+              <a:rPr lang="en-US" dirty="0" err="1"/>
+              <a:t>gitignore</a:t>
+            </a:r>
+            <a:r>
+              <a:rPr lang="en-US" dirty="0"/>
+              <a:t>, try pulling from **"upstream"** or fetching your github.com repository to match the upstream.</a:t>
+            </a:r>
+            <a:endParaRPr lang="en-GB" dirty="0"/>
+          </a:p>
+        </p:txBody>
+      </p:sp>
+    </p:spTree>
+    <p:extLst>
+      <p:ext uri="{BB962C8B-B14F-4D97-AF65-F5344CB8AC3E}">
+        <p14:creationId xmlns:p14="http://schemas.microsoft.com/office/powerpoint/2010/main" val="2113145376"/>
+      </p:ext>
+    </p:extLst>
+  </p:cSld>
+  <p:clrMapOvr>
+    <a:masterClrMapping/>
+  </p:clrMapOvr>
+</p:sld>
+</file>
+
+<file path=ppt/slides/slide48.xml><?xml version="1.0" encoding="utf-8"?>
+<p:sld xmlns:a="http://schemas.openxmlformats.org/drawingml/2006/main" xmlns:r="http://schemas.openxmlformats.org/officeDocument/2006/relationships" xmlns:p="http://schemas.openxmlformats.org/presentationml/2006/main">
+  <p:cSld>
+    <p:spTree>
+      <p:nvGrpSpPr>
+        <p:cNvPr id="1" name=""/>
+        <p:cNvGrpSpPr/>
+        <p:nvPr/>
+      </p:nvGrpSpPr>
+      <p:grpSpPr>
+        <a:xfrm>
+          <a:off x="0" y="0"/>
+          <a:ext cx="0" cy="0"/>
+          <a:chOff x="0" y="0"/>
+          <a:chExt cx="0" cy="0"/>
+        </a:xfrm>
+      </p:grpSpPr>
+      <p:sp>
+        <p:nvSpPr>
+          <p:cNvPr id="2" name="Nadpis 1"/>
+          <p:cNvSpPr>
+            <a:spLocks noGrp="1"/>
+          </p:cNvSpPr>
+          <p:nvPr>
+            <p:ph type="title"/>
+          </p:nvPr>
+        </p:nvSpPr>
+        <p:spPr/>
+        <p:txBody>
+          <a:bodyPr/>
+          <a:lstStyle/>
+          <a:p>
+            <a:r>
+              <a:rPr lang="en-US" dirty="0" smtClean="0"/>
+              <a:t>Pull requests</a:t>
+            </a:r>
+            <a:endParaRPr lang="en-GB" dirty="0"/>
+          </a:p>
+        </p:txBody>
+      </p:sp>
+      <p:sp>
+        <p:nvSpPr>
+          <p:cNvPr id="3" name="Zástupný symbol pro obsah 2"/>
+          <p:cNvSpPr>
+            <a:spLocks noGrp="1"/>
+          </p:cNvSpPr>
+          <p:nvPr>
+            <p:ph idx="1"/>
+          </p:nvPr>
+        </p:nvSpPr>
+        <p:spPr/>
+        <p:txBody>
+          <a:bodyPr>
+            <a:normAutofit fontScale="92500" lnSpcReduction="10000"/>
+          </a:bodyPr>
+          <a:lstStyle/>
+          <a:p>
+            <a:r>
+              <a:rPr lang="en-US" dirty="0" smtClean="0"/>
+              <a:t>Can </a:t>
+            </a:r>
+            <a:r>
+              <a:rPr lang="en-US" dirty="0"/>
+              <a:t>I request a pull for several files I changed together or I need to do it one by one</a:t>
+            </a:r>
+            <a:r>
+              <a:rPr lang="en-US" dirty="0" smtClean="0"/>
+              <a:t>?</a:t>
+            </a:r>
+          </a:p>
+          <a:p>
+            <a:pPr lvl="1"/>
+            <a:r>
+              <a:rPr lang="en-US" dirty="0"/>
+              <a:t>- the pull request is actually a merge of your whole branch. So whatever you do in YOUR fork (your copy of my repository), be it one or dozen new files, edits and deletes, is contained in your pull request</a:t>
+            </a:r>
+            <a:r>
+              <a:rPr lang="en-US" dirty="0" smtClean="0"/>
+              <a:t>.</a:t>
+            </a:r>
+          </a:p>
+          <a:p>
+            <a:r>
+              <a:rPr lang="en-US" dirty="0"/>
+              <a:t>What is the social </a:t>
+            </a:r>
+            <a:r>
+              <a:rPr lang="en-US" dirty="0" err="1"/>
+              <a:t>ettiquite</a:t>
+            </a:r>
+            <a:r>
+              <a:rPr lang="en-US" dirty="0"/>
+              <a:t> for </a:t>
+            </a:r>
+            <a:r>
+              <a:rPr lang="en-US" dirty="0" err="1"/>
+              <a:t>submiting</a:t>
+            </a:r>
+            <a:r>
+              <a:rPr lang="en-US" dirty="0"/>
+              <a:t> bug fixes and edits to someone else's code in a shared project (so as not to be disrespectful</a:t>
+            </a:r>
+            <a:r>
+              <a:rPr lang="en-US" dirty="0" smtClean="0"/>
+              <a:t>).</a:t>
+            </a:r>
+          </a:p>
+          <a:p>
+            <a:pPr marL="457200" lvl="1" indent="0">
+              <a:buNone/>
+            </a:pPr>
+            <a:r>
+              <a:rPr lang="en-US" dirty="0"/>
+              <a:t>1. Do not be a jerk.</a:t>
+            </a:r>
+            <a:br>
+              <a:rPr lang="en-US" dirty="0"/>
+            </a:br>
+            <a:r>
+              <a:rPr lang="en-US" dirty="0"/>
+              <a:t>2. Publicly listing an issue / pull request / feature request is way better than emailing/contacting separately the author to do this and that and that you have found a major flaw / issue, feature request. People usually maintain their project through GH already, so do not cross the system. </a:t>
+            </a:r>
+            <a:r>
+              <a:rPr lang="en-US" dirty="0" smtClean="0"/>
+              <a:t/>
+            </a:r>
+            <a:br>
+              <a:rPr lang="en-US" dirty="0" smtClean="0"/>
+            </a:br>
+            <a:r>
+              <a:rPr lang="en-US" dirty="0" smtClean="0"/>
+              <a:t>3. </a:t>
+            </a:r>
+            <a:r>
+              <a:rPr lang="en-US" dirty="0"/>
+              <a:t>IF your motivation is to contribute to the project and make it better, go ahead and fear not.</a:t>
+            </a:r>
+            <a:endParaRPr lang="en-US" dirty="0" smtClean="0"/>
+          </a:p>
+          <a:p>
+            <a:endParaRPr lang="en-GB" dirty="0"/>
+          </a:p>
+        </p:txBody>
+      </p:sp>
+    </p:spTree>
+    <p:extLst>
+      <p:ext uri="{BB962C8B-B14F-4D97-AF65-F5344CB8AC3E}">
+        <p14:creationId xmlns:p14="http://schemas.microsoft.com/office/powerpoint/2010/main" val="2038058813"/>
+      </p:ext>
+    </p:extLst>
+  </p:cSld>
+  <p:clrMapOvr>
+    <a:masterClrMapping/>
+  </p:clrMapOvr>
+</p:sld>
+</file>
+
+<file path=ppt/slides/slide49.xml><?xml version="1.0" encoding="utf-8"?>
+<p:sld xmlns:a="http://schemas.openxmlformats.org/drawingml/2006/main" xmlns:r="http://schemas.openxmlformats.org/officeDocument/2006/relationships" xmlns:p="http://schemas.openxmlformats.org/presentationml/2006/main">
+  <p:cSld>
+    <p:spTree>
+      <p:nvGrpSpPr>
+        <p:cNvPr id="1" name=""/>
+        <p:cNvGrpSpPr/>
+        <p:nvPr/>
+      </p:nvGrpSpPr>
+      <p:grpSpPr>
+        <a:xfrm>
+          <a:off x="0" y="0"/>
+          <a:ext cx="0" cy="0"/>
+          <a:chOff x="0" y="0"/>
+          <a:chExt cx="0" cy="0"/>
+        </a:xfrm>
+      </p:grpSpPr>
+      <p:sp>
+        <p:nvSpPr>
+          <p:cNvPr id="2" name="Nadpis 1"/>
+          <p:cNvSpPr>
+            <a:spLocks noGrp="1"/>
+          </p:cNvSpPr>
+          <p:nvPr>
+            <p:ph type="title"/>
+          </p:nvPr>
+        </p:nvSpPr>
+        <p:spPr/>
+        <p:txBody>
+          <a:bodyPr/>
+          <a:lstStyle/>
+          <a:p>
+            <a:r>
+              <a:rPr lang="en-US" dirty="0" smtClean="0"/>
+              <a:t>Publishing issues</a:t>
+            </a:r>
+            <a:endParaRPr lang="en-GB" dirty="0"/>
+          </a:p>
+        </p:txBody>
+      </p:sp>
+      <p:sp>
+        <p:nvSpPr>
+          <p:cNvPr id="3" name="Zástupný symbol pro obsah 2"/>
+          <p:cNvSpPr>
+            <a:spLocks noGrp="1"/>
+          </p:cNvSpPr>
+          <p:nvPr>
+            <p:ph idx="1"/>
+          </p:nvPr>
+        </p:nvSpPr>
+        <p:spPr/>
+        <p:txBody>
+          <a:bodyPr>
+            <a:normAutofit fontScale="92500" lnSpcReduction="20000"/>
+          </a:bodyPr>
+          <a:lstStyle/>
+          <a:p>
+            <a:r>
+              <a:rPr lang="en-US" dirty="0"/>
+              <a:t>Is it alright to publish code that other people have contributed to</a:t>
+            </a:r>
+            <a:r>
+              <a:rPr lang="en-US" dirty="0" smtClean="0"/>
+              <a:t>?</a:t>
+            </a:r>
+          </a:p>
+          <a:p>
+            <a:pPr lvl="1"/>
+            <a:r>
+              <a:rPr lang="en-US" dirty="0" smtClean="0"/>
+              <a:t>Yes</a:t>
+            </a:r>
+            <a:r>
+              <a:rPr lang="en-US" dirty="0"/>
+              <a:t>, as long as you respect the </a:t>
+            </a:r>
+            <a:r>
+              <a:rPr lang="en-US" dirty="0" err="1"/>
+              <a:t>licence</a:t>
+            </a:r>
+            <a:r>
+              <a:rPr lang="en-US" dirty="0"/>
+              <a:t>. Most of the repositories published at GitHub do have a </a:t>
+            </a:r>
+            <a:r>
+              <a:rPr lang="en-US" dirty="0" err="1"/>
+              <a:t>licence</a:t>
+            </a:r>
+            <a:r>
+              <a:rPr lang="en-US" dirty="0"/>
+              <a:t> file. This is mostly MIT (use as you want, even for commercial use) or variants of GNU </a:t>
+            </a:r>
+            <a:r>
+              <a:rPr lang="en-US" dirty="0" err="1"/>
+              <a:t>licence</a:t>
+            </a:r>
+            <a:r>
+              <a:rPr lang="en-US" dirty="0"/>
+              <a:t>. If someone contributes to your repository, she has to be comfortable with that license. On the other hand, you should acknowledge his co-authorship. - if you have some code that you worked on together with other people, you probably should agree on a </a:t>
+            </a:r>
+            <a:r>
+              <a:rPr lang="en-US" dirty="0" err="1"/>
+              <a:t>licence</a:t>
+            </a:r>
+            <a:r>
+              <a:rPr lang="en-US" dirty="0"/>
+              <a:t> of their contribution - be it MIT, GNU, some proprietary one or not to share at all</a:t>
+            </a:r>
+            <a:r>
+              <a:rPr lang="en-US" dirty="0" smtClean="0"/>
+              <a:t>.</a:t>
+            </a:r>
+          </a:p>
+          <a:p>
+            <a:r>
+              <a:rPr lang="en-US" dirty="0"/>
+              <a:t>Do tags exist only in GitHub, or are they a feature of </a:t>
+            </a:r>
+            <a:r>
+              <a:rPr lang="en-US" dirty="0" err="1"/>
+              <a:t>git</a:t>
+            </a:r>
+            <a:r>
+              <a:rPr lang="en-US" dirty="0"/>
+              <a:t> repositories (whether they are managed in GitHub or not</a:t>
+            </a:r>
+            <a:r>
+              <a:rPr lang="en-US" dirty="0" smtClean="0"/>
+              <a:t>)?</a:t>
+            </a:r>
+          </a:p>
+          <a:p>
+            <a:pPr lvl="1"/>
+            <a:r>
+              <a:rPr lang="en-US" dirty="0" smtClean="0"/>
+              <a:t>It </a:t>
+            </a:r>
+            <a:r>
+              <a:rPr lang="en-US" dirty="0"/>
+              <a:t>is a general feature. You can right-click any commit in GH-</a:t>
+            </a:r>
+            <a:r>
+              <a:rPr lang="en-US" dirty="0" err="1"/>
+              <a:t>Destkop</a:t>
+            </a:r>
+            <a:r>
+              <a:rPr lang="en-US" dirty="0"/>
+              <a:t> and select Create Tag. Remember, that whatever you can do with **GitHub Desktop** (not using any web features), you can also do with ANY other </a:t>
+            </a:r>
+            <a:r>
+              <a:rPr lang="en-US" dirty="0" err="1"/>
+              <a:t>git</a:t>
+            </a:r>
+            <a:r>
+              <a:rPr lang="en-US" dirty="0"/>
+              <a:t> client (and usually more). Tag is just a pointer on a specific commit, immutable in time. Github.com then presents all the tags and releases nice and pretty</a:t>
+            </a:r>
+            <a:r>
+              <a:rPr lang="en-US" dirty="0" smtClean="0"/>
+              <a:t>.</a:t>
+            </a:r>
+            <a:endParaRPr lang="en-GB" dirty="0"/>
+          </a:p>
+        </p:txBody>
+      </p:sp>
+    </p:spTree>
+    <p:extLst>
+      <p:ext uri="{BB962C8B-B14F-4D97-AF65-F5344CB8AC3E}">
+        <p14:creationId xmlns:p14="http://schemas.microsoft.com/office/powerpoint/2010/main" val="1409373989"/>
+      </p:ext>
+    </p:extLst>
+  </p:cSld>
+  <p:clrMapOvr>
+    <a:masterClrMapping/>
+  </p:clrMapOvr>
+</p:sld>
+</file>
+
+<file path=ppt/slides/slide5.xml><?xml version="1.0" encoding="utf-8"?>
+<p:sld xmlns:a="http://schemas.openxmlformats.org/drawingml/2006/main" xmlns:r="http://schemas.openxmlformats.org/officeDocument/2006/relationships" xmlns:p="http://schemas.openxmlformats.org/presentationml/2006/main">
+  <p:cSld>
+    <p:spTree>
+      <p:nvGrpSpPr>
+        <p:cNvPr id="1" name=""/>
+        <p:cNvGrpSpPr/>
+        <p:nvPr/>
+      </p:nvGrpSpPr>
+      <p:grpSpPr>
+        <a:xfrm>
+          <a:off x="0" y="0"/>
+          <a:ext cx="0" cy="0"/>
+          <a:chOff x="0" y="0"/>
+          <a:chExt cx="0" cy="0"/>
+        </a:xfrm>
+      </p:grpSpPr>
+      <p:sp>
+        <p:nvSpPr>
+          <p:cNvPr id="2" name="Nadpis 1"/>
+          <p:cNvSpPr>
+            <a:spLocks noGrp="1"/>
+          </p:cNvSpPr>
+          <p:nvPr>
+            <p:ph type="title"/>
+          </p:nvPr>
+        </p:nvSpPr>
+        <p:spPr/>
+        <p:txBody>
+          <a:bodyPr/>
+          <a:lstStyle/>
+          <a:p>
+            <a:r>
+              <a:rPr lang="cs-CZ" dirty="0" err="1" smtClean="0"/>
+              <a:t>Version</a:t>
+            </a:r>
+            <a:r>
+              <a:rPr lang="cs-CZ" dirty="0" smtClean="0"/>
+              <a:t> </a:t>
+            </a:r>
+            <a:r>
+              <a:rPr lang="cs-CZ" dirty="0" err="1" smtClean="0"/>
+              <a:t>control</a:t>
+            </a:r>
+            <a:r>
+              <a:rPr lang="cs-CZ" dirty="0" smtClean="0"/>
+              <a:t> </a:t>
+            </a:r>
+            <a:r>
+              <a:rPr lang="cs-CZ" dirty="0" err="1" smtClean="0"/>
+              <a:t>system</a:t>
+            </a:r>
+            <a:endParaRPr lang="en-GB" dirty="0"/>
+          </a:p>
+        </p:txBody>
+      </p:sp>
+      <p:sp>
+        <p:nvSpPr>
+          <p:cNvPr id="3" name="Zástupný symbol pro obsah 2"/>
+          <p:cNvSpPr>
+            <a:spLocks noGrp="1"/>
+          </p:cNvSpPr>
+          <p:nvPr>
+            <p:ph idx="1"/>
+          </p:nvPr>
+        </p:nvSpPr>
+        <p:spPr/>
+        <p:txBody>
+          <a:bodyPr/>
+          <a:lstStyle/>
+          <a:p>
+            <a:r>
+              <a:rPr lang="cs-CZ" dirty="0" err="1" smtClean="0"/>
+              <a:t>Tracks</a:t>
+            </a:r>
+            <a:r>
+              <a:rPr lang="cs-CZ" dirty="0" smtClean="0"/>
+              <a:t> </a:t>
+            </a:r>
+            <a:r>
+              <a:rPr lang="cs-CZ" dirty="0" err="1" smtClean="0"/>
+              <a:t>all</a:t>
+            </a:r>
+            <a:r>
+              <a:rPr lang="cs-CZ" dirty="0" smtClean="0"/>
+              <a:t> </a:t>
+            </a:r>
+            <a:r>
+              <a:rPr lang="cs-CZ" dirty="0" err="1" smtClean="0"/>
+              <a:t>the</a:t>
+            </a:r>
+            <a:r>
+              <a:rPr lang="cs-CZ" dirty="0" smtClean="0"/>
+              <a:t> </a:t>
+            </a:r>
+            <a:r>
+              <a:rPr lang="cs-CZ" dirty="0" err="1" smtClean="0"/>
+              <a:t>revisions</a:t>
+            </a:r>
+            <a:r>
+              <a:rPr lang="cs-CZ" dirty="0" smtClean="0"/>
+              <a:t>, </a:t>
+            </a:r>
+            <a:r>
+              <a:rPr lang="cs-CZ" dirty="0" err="1" smtClean="0"/>
+              <a:t>creates</a:t>
+            </a:r>
+            <a:r>
+              <a:rPr lang="cs-CZ" dirty="0" smtClean="0"/>
+              <a:t> </a:t>
+            </a:r>
+            <a:r>
+              <a:rPr lang="cs-CZ" dirty="0" err="1" smtClean="0"/>
+              <a:t>safe</a:t>
+            </a:r>
+            <a:r>
+              <a:rPr lang="cs-CZ" dirty="0" smtClean="0"/>
+              <a:t> „</a:t>
+            </a:r>
+            <a:r>
+              <a:rPr lang="cs-CZ" dirty="0" err="1" smtClean="0"/>
+              <a:t>Checkpoints</a:t>
+            </a:r>
+            <a:r>
+              <a:rPr lang="cs-CZ" dirty="0" smtClean="0"/>
+              <a:t>“</a:t>
+            </a:r>
+          </a:p>
+          <a:p>
+            <a:r>
+              <a:rPr lang="cs-CZ" dirty="0" err="1" smtClean="0"/>
+              <a:t>Allows</a:t>
+            </a:r>
+            <a:r>
+              <a:rPr lang="cs-CZ" dirty="0" smtClean="0"/>
+              <a:t> </a:t>
+            </a:r>
+            <a:r>
+              <a:rPr lang="cs-CZ" dirty="0" err="1" smtClean="0"/>
+              <a:t>organizing</a:t>
+            </a:r>
+            <a:r>
+              <a:rPr lang="cs-CZ" dirty="0" smtClean="0"/>
+              <a:t> </a:t>
+            </a:r>
+            <a:r>
+              <a:rPr lang="cs-CZ" dirty="0" err="1" smtClean="0"/>
+              <a:t>the</a:t>
+            </a:r>
+            <a:r>
+              <a:rPr lang="cs-CZ" dirty="0" smtClean="0"/>
+              <a:t> </a:t>
+            </a:r>
+            <a:r>
+              <a:rPr lang="cs-CZ" dirty="0" err="1" smtClean="0"/>
+              <a:t>project</a:t>
+            </a:r>
+            <a:r>
+              <a:rPr lang="cs-CZ" dirty="0" smtClean="0"/>
+              <a:t> in </a:t>
+            </a:r>
+            <a:r>
+              <a:rPr lang="cs-CZ" dirty="0" err="1" smtClean="0"/>
+              <a:t>multiple</a:t>
+            </a:r>
+            <a:r>
+              <a:rPr lang="cs-CZ" dirty="0" smtClean="0"/>
+              <a:t> (</a:t>
+            </a:r>
+            <a:r>
+              <a:rPr lang="cs-CZ" dirty="0" err="1" smtClean="0"/>
+              <a:t>concurrent</a:t>
+            </a:r>
+            <a:r>
+              <a:rPr lang="cs-CZ" dirty="0" smtClean="0"/>
+              <a:t>) </a:t>
+            </a:r>
+            <a:r>
+              <a:rPr lang="cs-CZ" dirty="0" err="1" smtClean="0"/>
+              <a:t>branches</a:t>
+            </a:r>
+            <a:endParaRPr lang="cs-CZ" dirty="0" smtClean="0"/>
+          </a:p>
+          <a:p>
+            <a:r>
+              <a:rPr lang="cs-CZ" dirty="0" err="1" smtClean="0"/>
+              <a:t>Simplifies</a:t>
+            </a:r>
+            <a:r>
+              <a:rPr lang="cs-CZ" dirty="0" smtClean="0"/>
+              <a:t> </a:t>
+            </a:r>
+            <a:r>
+              <a:rPr lang="cs-CZ" dirty="0" err="1" smtClean="0"/>
+              <a:t>cooperation</a:t>
+            </a:r>
+            <a:endParaRPr lang="cs-CZ" dirty="0" smtClean="0"/>
+          </a:p>
+          <a:p>
+            <a:endParaRPr lang="en-GB" dirty="0"/>
+          </a:p>
+        </p:txBody>
+      </p:sp>
+      <p:sp>
+        <p:nvSpPr>
+          <p:cNvPr id="4" name="Obdélník 3"/>
+          <p:cNvSpPr/>
+          <p:nvPr/>
+        </p:nvSpPr>
+        <p:spPr>
+          <a:xfrm>
+            <a:off x="6096000" y="5576798"/>
+            <a:ext cx="6096000" cy="1200329"/>
+          </a:xfrm>
+          <a:prstGeom prst="rect">
+            <a:avLst/>
+          </a:prstGeom>
+        </p:spPr>
+        <p:txBody>
+          <a:bodyPr>
+            <a:spAutoFit/>
+          </a:bodyPr>
+          <a:lstStyle/>
+          <a:p>
+            <a:r>
+              <a:rPr lang="en-US" i="1" dirty="0" smtClean="0">
+                <a:solidFill>
+                  <a:srgbClr val="222222"/>
+                </a:solidFill>
+                <a:latin typeface="Arial" panose="020B0604020202020204" pitchFamily="34" charset="0"/>
+              </a:rPr>
+              <a:t>“The </a:t>
+            </a:r>
+            <a:r>
+              <a:rPr lang="en-US" i="1" dirty="0">
+                <a:solidFill>
+                  <a:srgbClr val="222222"/>
+                </a:solidFill>
+                <a:latin typeface="Arial" panose="020B0604020202020204" pitchFamily="34" charset="0"/>
+              </a:rPr>
+              <a:t>model enclosed is the earliest I have in my files, so it may not duplicate what is in my paper</a:t>
+            </a:r>
+            <a:r>
+              <a:rPr lang="en-US" i="1" dirty="0" smtClean="0">
+                <a:solidFill>
+                  <a:srgbClr val="222222"/>
+                </a:solidFill>
+                <a:latin typeface="Arial" panose="020B0604020202020204" pitchFamily="34" charset="0"/>
+              </a:rPr>
+              <a:t>.”</a:t>
+            </a:r>
+          </a:p>
+          <a:p>
+            <a:endParaRPr lang="en-US" i="1" dirty="0" smtClean="0">
+              <a:solidFill>
+                <a:srgbClr val="222222"/>
+              </a:solidFill>
+              <a:latin typeface="Arial" panose="020B0604020202020204" pitchFamily="34" charset="0"/>
+            </a:endParaRPr>
+          </a:p>
+          <a:p>
+            <a:pPr algn="r"/>
+            <a:r>
+              <a:rPr lang="en-US" i="1" dirty="0" smtClean="0">
+                <a:solidFill>
+                  <a:srgbClr val="222222"/>
+                </a:solidFill>
+                <a:latin typeface="Arial" panose="020B0604020202020204" pitchFamily="34" charset="0"/>
+              </a:rPr>
+              <a:t>Undisclosed author, 01/05/2022</a:t>
+            </a:r>
+            <a:endParaRPr lang="en-US" i="1" dirty="0">
+              <a:solidFill>
+                <a:srgbClr val="222222"/>
+              </a:solidFill>
+              <a:latin typeface="Arial" panose="020B0604020202020204" pitchFamily="34" charset="0"/>
+            </a:endParaRPr>
+          </a:p>
+        </p:txBody>
+      </p:sp>
+    </p:spTree>
+    <p:extLst>
+      <p:ext uri="{BB962C8B-B14F-4D97-AF65-F5344CB8AC3E}">
+        <p14:creationId xmlns:p14="http://schemas.microsoft.com/office/powerpoint/2010/main" val="38010002"/>
+      </p:ext>
+    </p:extLst>
+  </p:cSld>
+  <p:clrMapOvr>
+    <a:masterClrMapping/>
+  </p:clrMapOvr>
+  <p:timing>
+    <p:tnLst>
+      <p:par>
+        <p:cTn id="1" dur="indefinite" restart="never" nodeType="tmRoot"/>
+      </p:par>
+    </p:tnLst>
+  </p:timing>
+</p:sld>
+</file>
+
+<file path=ppt/slides/slide50.xml><?xml version="1.0" encoding="utf-8"?>
+<p:sld xmlns:a="http://schemas.openxmlformats.org/drawingml/2006/main" xmlns:r="http://schemas.openxmlformats.org/officeDocument/2006/relationships" xmlns:p="http://schemas.openxmlformats.org/presentationml/2006/main">
+  <p:cSld>
+    <p:spTree>
+      <p:nvGrpSpPr>
+        <p:cNvPr id="1" name=""/>
+        <p:cNvGrpSpPr/>
+        <p:nvPr/>
+      </p:nvGrpSpPr>
+      <p:grpSpPr>
+        <a:xfrm>
+          <a:off x="0" y="0"/>
+          <a:ext cx="0" cy="0"/>
+          <a:chOff x="0" y="0"/>
+          <a:chExt cx="0" cy="0"/>
+        </a:xfrm>
+      </p:grpSpPr>
+      <p:sp>
+        <p:nvSpPr>
+          <p:cNvPr id="2" name="Nadpis 1"/>
+          <p:cNvSpPr>
+            <a:spLocks noGrp="1"/>
+          </p:cNvSpPr>
+          <p:nvPr>
+            <p:ph type="title"/>
+          </p:nvPr>
+        </p:nvSpPr>
+        <p:spPr/>
+        <p:txBody>
+          <a:bodyPr/>
+          <a:lstStyle/>
+          <a:p>
+            <a:r>
+              <a:rPr lang="en-US" dirty="0" smtClean="0"/>
+              <a:t>Other</a:t>
+            </a:r>
+            <a:endParaRPr lang="en-GB" dirty="0"/>
+          </a:p>
+        </p:txBody>
+      </p:sp>
+      <p:sp>
+        <p:nvSpPr>
+          <p:cNvPr id="3" name="Zástupný symbol pro obsah 2"/>
+          <p:cNvSpPr>
+            <a:spLocks noGrp="1"/>
+          </p:cNvSpPr>
+          <p:nvPr>
+            <p:ph idx="1"/>
+          </p:nvPr>
+        </p:nvSpPr>
+        <p:spPr/>
+        <p:txBody>
+          <a:bodyPr>
+            <a:normAutofit fontScale="70000" lnSpcReduction="20000"/>
+          </a:bodyPr>
+          <a:lstStyle/>
+          <a:p>
+            <a:r>
+              <a:rPr lang="en-US" dirty="0"/>
+              <a:t>Why does </a:t>
+            </a:r>
+            <a:r>
+              <a:rPr lang="en-US" dirty="0" err="1"/>
+              <a:t>git</a:t>
+            </a:r>
+            <a:r>
+              <a:rPr lang="en-US" dirty="0"/>
+              <a:t> command line exist if </a:t>
+            </a:r>
+            <a:r>
+              <a:rPr lang="en-US" dirty="0" err="1"/>
+              <a:t>github</a:t>
+            </a:r>
+            <a:r>
+              <a:rPr lang="en-US" dirty="0"/>
+              <a:t> desktop is a thing?</a:t>
+            </a:r>
+          </a:p>
+          <a:p>
+            <a:pPr lvl="1"/>
+            <a:r>
+              <a:rPr lang="en-US" dirty="0"/>
+              <a:t>- *First, </a:t>
+            </a:r>
+            <a:r>
+              <a:rPr lang="en-US" dirty="0" err="1"/>
+              <a:t>Git</a:t>
+            </a:r>
+            <a:r>
+              <a:rPr lang="en-US" dirty="0"/>
+              <a:t> comes from the Unix people. They love command line. They might die without touching the keyboard regularly :) Most of the </a:t>
+            </a:r>
+            <a:r>
+              <a:rPr lang="en-US" dirty="0" err="1"/>
+              <a:t>git</a:t>
+            </a:r>
+            <a:r>
+              <a:rPr lang="en-US" dirty="0"/>
+              <a:t> tools are just a GUI on top of these commands. Second, it is often used in the help files, because that is the right way to do, regardless in which menu item or under which name it is hidden in different </a:t>
+            </a:r>
+            <a:r>
+              <a:rPr lang="en-US" dirty="0" err="1"/>
+              <a:t>git</a:t>
+            </a:r>
+            <a:r>
+              <a:rPr lang="en-US" dirty="0"/>
+              <a:t> clients. GitHub desktop is only one of such clients. I personally find nice, that all the commands are </a:t>
+            </a:r>
+            <a:r>
+              <a:rPr lang="en-US" dirty="0" err="1"/>
+              <a:t>somwhat</a:t>
+            </a:r>
+            <a:r>
+              <a:rPr lang="en-US" dirty="0"/>
+              <a:t> hidden from us. You can however grab any other tool to use with </a:t>
+            </a:r>
+            <a:r>
+              <a:rPr lang="en-US" dirty="0" err="1"/>
+              <a:t>Git</a:t>
+            </a:r>
+            <a:r>
+              <a:rPr lang="en-US" dirty="0"/>
+              <a:t> or GitHub.*</a:t>
+            </a:r>
+          </a:p>
+          <a:p>
+            <a:r>
+              <a:rPr lang="en-US" dirty="0"/>
+              <a:t>Can I write into files within a repository from the command line?</a:t>
+            </a:r>
+          </a:p>
+          <a:p>
+            <a:pPr lvl="1"/>
+            <a:r>
+              <a:rPr lang="en-US" dirty="0"/>
+              <a:t>- *Something like </a:t>
+            </a:r>
+            <a:r>
+              <a:rPr lang="en-US" dirty="0">
+                <a:hlinkClick r:id="rId2"/>
+              </a:rPr>
+              <a:t>https://</a:t>
+            </a:r>
+            <a:r>
+              <a:rPr lang="en-US" dirty="0" smtClean="0">
+                <a:hlinkClick r:id="rId2"/>
+              </a:rPr>
+              <a:t>superuser.com/questions/186857/how-do-i-edit-text-files-in-the-windows-command-prompt</a:t>
+            </a:r>
+            <a:r>
+              <a:rPr lang="en-US" dirty="0" smtClean="0"/>
+              <a:t>  </a:t>
+            </a:r>
+            <a:r>
+              <a:rPr lang="en-US" dirty="0"/>
+              <a:t>? The repository is basically your local folder. Or you meant accessing the history, </a:t>
+            </a:r>
+            <a:r>
+              <a:rPr lang="en-US" dirty="0" err="1"/>
+              <a:t>commiting</a:t>
+            </a:r>
+            <a:r>
+              <a:rPr lang="en-US" dirty="0"/>
+              <a:t>, pushing, and all that stuff? The </a:t>
+            </a:r>
+            <a:r>
+              <a:rPr lang="en-US" dirty="0" err="1"/>
+              <a:t>Git</a:t>
+            </a:r>
+            <a:r>
+              <a:rPr lang="en-US" dirty="0"/>
+              <a:t> has been designed for command line, but I am no expert on the commands. The </a:t>
+            </a:r>
+            <a:r>
+              <a:rPr lang="en-US" dirty="0">
+                <a:hlinkClick r:id="rId3"/>
+              </a:rPr>
+              <a:t>https://git-scm.com/docs</a:t>
+            </a:r>
+            <a:r>
+              <a:rPr lang="en-US" dirty="0" smtClean="0">
+                <a:hlinkClick r:id="rId3"/>
+              </a:rPr>
+              <a:t>/</a:t>
+            </a:r>
+            <a:r>
+              <a:rPr lang="en-US" dirty="0" smtClean="0"/>
+              <a:t>  </a:t>
+            </a:r>
+            <a:r>
+              <a:rPr lang="en-US" dirty="0"/>
+              <a:t>should have your back. But unless you are a big nerd {no offence), you are just fine to stick to any GUI tool you like (the GitHub desktop is possibly the simplest and most user-friendly one). You can of course edit your files directly in the github.com, but this is really impractical (that is, do not do it!) for your source codes.*</a:t>
+            </a:r>
+          </a:p>
+          <a:p>
+            <a:r>
+              <a:rPr lang="en-US" dirty="0"/>
+              <a:t>Can two repositories be merged? I'm not sure why this would have to happen, but I'm curious.</a:t>
+            </a:r>
+          </a:p>
+          <a:p>
+            <a:pPr lvl="1"/>
+            <a:r>
+              <a:rPr lang="en-US" dirty="0"/>
+              <a:t>Yes, though it is quite an extreme case. You can have more than one "origin" sources. But this is impractical and could do more harm than good.</a:t>
+            </a:r>
+          </a:p>
+          <a:p>
+            <a:endParaRPr lang="en-GB" dirty="0"/>
+          </a:p>
+          <a:p>
+            <a:endParaRPr lang="en-GB" dirty="0"/>
+          </a:p>
+        </p:txBody>
+      </p:sp>
+    </p:spTree>
+    <p:extLst>
+      <p:ext uri="{BB962C8B-B14F-4D97-AF65-F5344CB8AC3E}">
+        <p14:creationId xmlns:p14="http://schemas.microsoft.com/office/powerpoint/2010/main" val="2399496051"/>
+      </p:ext>
+    </p:extLst>
+  </p:cSld>
+  <p:clrMapOvr>
+    <a:masterClrMapping/>
+  </p:clrMapOvr>
+</p:sld>
+</file>
+
+<file path=ppt/slides/slide51.xml><?xml version="1.0" encoding="utf-8"?>
+<p:sld xmlns:a="http://schemas.openxmlformats.org/drawingml/2006/main" xmlns:r="http://schemas.openxmlformats.org/officeDocument/2006/relationships" xmlns:p="http://schemas.openxmlformats.org/presentationml/2006/main">
+  <p:cSld>
+    <p:spTree>
+      <p:nvGrpSpPr>
+        <p:cNvPr id="1" name=""/>
+        <p:cNvGrpSpPr/>
+        <p:nvPr/>
+      </p:nvGrpSpPr>
+      <p:grpSpPr>
+        <a:xfrm>
+          <a:off x="0" y="0"/>
+          <a:ext cx="0" cy="0"/>
+          <a:chOff x="0" y="0"/>
+          <a:chExt cx="0" cy="0"/>
+        </a:xfrm>
+      </p:grpSpPr>
+      <p:sp>
+        <p:nvSpPr>
           <p:cNvPr id="4" name="Nadpis 3"/>
           <p:cNvSpPr>
             <a:spLocks noGrp="1"/>
@@ -10420,7 +12101,7 @@
 </p:sld>
 </file>
 
-<file path=ppt/slides/slide44.xml><?xml version="1.0" encoding="utf-8"?>
+<file path=ppt/slides/slide52.xml><?xml version="1.0" encoding="utf-8"?>
 <p:sld xmlns:a="http://schemas.openxmlformats.org/drawingml/2006/main" xmlns:r="http://schemas.openxmlformats.org/officeDocument/2006/relationships" xmlns:p="http://schemas.openxmlformats.org/presentationml/2006/main">
   <p:cSld>
     <p:spTree>
@@ -10453,8 +12134,8 @@
           <a:lstStyle/>
           <a:p>
             <a:r>
-              <a:rPr lang="en-US" dirty="0" err="1" smtClean="0"/>
-              <a:t>Golas</a:t>
+              <a:rPr lang="en-US" dirty="0" smtClean="0"/>
+              <a:t>Training Goals</a:t>
             </a:r>
             <a:endParaRPr lang="en-GB" dirty="0"/>
           </a:p>
@@ -10486,8 +12167,13 @@
             <a:pPr lvl="1"/>
             <a:r>
               <a:rPr lang="en-US" dirty="0" smtClean="0"/>
-              <a:t>Use GitHub desktop for that</a:t>
-            </a:r>
+              <a:t>Use GitHub desktop for </a:t>
+            </a:r>
+            <a:r>
+              <a:rPr lang="en-US" dirty="0" smtClean="0"/>
+              <a:t>that, as it is the simplest</a:t>
+            </a:r>
+            <a:endParaRPr lang="en-US" dirty="0" smtClean="0"/>
           </a:p>
           <a:p>
             <a:pPr lvl="1"/>
@@ -10629,306 +12315,6 @@
   <p:clrMapOvr>
     <a:masterClrMapping/>
   </p:clrMapOvr>
-</p:sld>
-</file>
-
-<file path=ppt/slides/slide5.xml><?xml version="1.0" encoding="utf-8"?>
-<p:sld xmlns:a="http://schemas.openxmlformats.org/drawingml/2006/main" xmlns:r="http://schemas.openxmlformats.org/officeDocument/2006/relationships" xmlns:p="http://schemas.openxmlformats.org/presentationml/2006/main">
-  <p:cSld>
-    <p:spTree>
-      <p:nvGrpSpPr>
-        <p:cNvPr id="1" name=""/>
-        <p:cNvGrpSpPr/>
-        <p:nvPr/>
-      </p:nvGrpSpPr>
-      <p:grpSpPr>
-        <a:xfrm>
-          <a:off x="0" y="0"/>
-          <a:ext cx="0" cy="0"/>
-          <a:chOff x="0" y="0"/>
-          <a:chExt cx="0" cy="0"/>
-        </a:xfrm>
-      </p:grpSpPr>
-      <p:sp>
-        <p:nvSpPr>
-          <p:cNvPr id="2" name="Nadpis 1"/>
-          <p:cNvSpPr>
-            <a:spLocks noGrp="1"/>
-          </p:cNvSpPr>
-          <p:nvPr>
-            <p:ph type="title"/>
-          </p:nvPr>
-        </p:nvSpPr>
-        <p:spPr/>
-        <p:txBody>
-          <a:bodyPr/>
-          <a:lstStyle/>
-          <a:p>
-            <a:r>
-              <a:rPr lang="cs-CZ" dirty="0" err="1" smtClean="0"/>
-              <a:t>Version</a:t>
-            </a:r>
-            <a:r>
-              <a:rPr lang="cs-CZ" dirty="0" smtClean="0"/>
-              <a:t> </a:t>
-            </a:r>
-            <a:r>
-              <a:rPr lang="cs-CZ" dirty="0" err="1" smtClean="0"/>
-              <a:t>control</a:t>
-            </a:r>
-            <a:r>
-              <a:rPr lang="cs-CZ" dirty="0" smtClean="0"/>
-              <a:t> </a:t>
-            </a:r>
-            <a:r>
-              <a:rPr lang="cs-CZ" dirty="0" err="1" smtClean="0"/>
-              <a:t>system</a:t>
-            </a:r>
-            <a:endParaRPr lang="en-GB" dirty="0"/>
-          </a:p>
-        </p:txBody>
-      </p:sp>
-      <p:sp>
-        <p:nvSpPr>
-          <p:cNvPr id="3" name="Zástupný symbol pro obsah 2"/>
-          <p:cNvSpPr>
-            <a:spLocks noGrp="1"/>
-          </p:cNvSpPr>
-          <p:nvPr>
-            <p:ph idx="1"/>
-          </p:nvPr>
-        </p:nvSpPr>
-        <p:spPr/>
-        <p:txBody>
-          <a:bodyPr/>
-          <a:lstStyle/>
-          <a:p>
-            <a:r>
-              <a:rPr lang="cs-CZ" dirty="0" err="1" smtClean="0"/>
-              <a:t>Tracks</a:t>
-            </a:r>
-            <a:r>
-              <a:rPr lang="cs-CZ" dirty="0" smtClean="0"/>
-              <a:t> </a:t>
-            </a:r>
-            <a:r>
-              <a:rPr lang="cs-CZ" dirty="0" err="1" smtClean="0"/>
-              <a:t>all</a:t>
-            </a:r>
-            <a:r>
-              <a:rPr lang="cs-CZ" dirty="0" smtClean="0"/>
-              <a:t> </a:t>
-            </a:r>
-            <a:r>
-              <a:rPr lang="cs-CZ" dirty="0" err="1" smtClean="0"/>
-              <a:t>the</a:t>
-            </a:r>
-            <a:r>
-              <a:rPr lang="cs-CZ" dirty="0" smtClean="0"/>
-              <a:t> </a:t>
-            </a:r>
-            <a:r>
-              <a:rPr lang="cs-CZ" dirty="0" err="1" smtClean="0"/>
-              <a:t>revisions</a:t>
-            </a:r>
-            <a:r>
-              <a:rPr lang="cs-CZ" dirty="0" smtClean="0"/>
-              <a:t>, </a:t>
-            </a:r>
-            <a:r>
-              <a:rPr lang="cs-CZ" dirty="0" err="1" smtClean="0"/>
-              <a:t>creates</a:t>
-            </a:r>
-            <a:r>
-              <a:rPr lang="cs-CZ" dirty="0" smtClean="0"/>
-              <a:t> </a:t>
-            </a:r>
-            <a:r>
-              <a:rPr lang="cs-CZ" dirty="0" err="1" smtClean="0"/>
-              <a:t>safe</a:t>
-            </a:r>
-            <a:r>
-              <a:rPr lang="cs-CZ" dirty="0" smtClean="0"/>
-              <a:t> „</a:t>
-            </a:r>
-            <a:r>
-              <a:rPr lang="cs-CZ" dirty="0" err="1" smtClean="0"/>
-              <a:t>Checkpoints</a:t>
-            </a:r>
-            <a:r>
-              <a:rPr lang="cs-CZ" dirty="0" smtClean="0"/>
-              <a:t>“</a:t>
-            </a:r>
-          </a:p>
-          <a:p>
-            <a:r>
-              <a:rPr lang="cs-CZ" dirty="0" err="1" smtClean="0"/>
-              <a:t>Allows</a:t>
-            </a:r>
-            <a:r>
-              <a:rPr lang="cs-CZ" dirty="0" smtClean="0"/>
-              <a:t> </a:t>
-            </a:r>
-            <a:r>
-              <a:rPr lang="cs-CZ" dirty="0" err="1" smtClean="0"/>
-              <a:t>organizing</a:t>
-            </a:r>
-            <a:r>
-              <a:rPr lang="cs-CZ" dirty="0" smtClean="0"/>
-              <a:t> </a:t>
-            </a:r>
-            <a:r>
-              <a:rPr lang="cs-CZ" dirty="0" err="1" smtClean="0"/>
-              <a:t>the</a:t>
-            </a:r>
-            <a:r>
-              <a:rPr lang="cs-CZ" dirty="0" smtClean="0"/>
-              <a:t> </a:t>
-            </a:r>
-            <a:r>
-              <a:rPr lang="cs-CZ" dirty="0" err="1" smtClean="0"/>
-              <a:t>project</a:t>
-            </a:r>
-            <a:r>
-              <a:rPr lang="cs-CZ" dirty="0" smtClean="0"/>
-              <a:t> in </a:t>
-            </a:r>
-            <a:r>
-              <a:rPr lang="cs-CZ" dirty="0" err="1" smtClean="0"/>
-              <a:t>multiple</a:t>
-            </a:r>
-            <a:r>
-              <a:rPr lang="cs-CZ" dirty="0" smtClean="0"/>
-              <a:t> (</a:t>
-            </a:r>
-            <a:r>
-              <a:rPr lang="cs-CZ" dirty="0" err="1" smtClean="0"/>
-              <a:t>concurrent</a:t>
-            </a:r>
-            <a:r>
-              <a:rPr lang="cs-CZ" dirty="0" smtClean="0"/>
-              <a:t>) </a:t>
-            </a:r>
-            <a:r>
-              <a:rPr lang="cs-CZ" dirty="0" err="1" smtClean="0"/>
-              <a:t>branches</a:t>
-            </a:r>
-            <a:endParaRPr lang="cs-CZ" dirty="0" smtClean="0"/>
-          </a:p>
-          <a:p>
-            <a:r>
-              <a:rPr lang="cs-CZ" dirty="0" err="1" smtClean="0"/>
-              <a:t>Simplifies</a:t>
-            </a:r>
-            <a:r>
-              <a:rPr lang="cs-CZ" dirty="0" smtClean="0"/>
-              <a:t> </a:t>
-            </a:r>
-            <a:r>
-              <a:rPr lang="cs-CZ" dirty="0" err="1" smtClean="0"/>
-              <a:t>cooperation</a:t>
-            </a:r>
-            <a:endParaRPr lang="cs-CZ" dirty="0" smtClean="0"/>
-          </a:p>
-          <a:p>
-            <a:endParaRPr lang="en-GB" dirty="0"/>
-          </a:p>
-        </p:txBody>
-      </p:sp>
-      <p:sp>
-        <p:nvSpPr>
-          <p:cNvPr id="4" name="Obdélník 3"/>
-          <p:cNvSpPr/>
-          <p:nvPr/>
-        </p:nvSpPr>
-        <p:spPr>
-          <a:xfrm>
-            <a:off x="6096000" y="5576798"/>
-            <a:ext cx="6096000" cy="1200329"/>
-          </a:xfrm>
-          <a:prstGeom prst="rect">
-            <a:avLst/>
-          </a:prstGeom>
-        </p:spPr>
-        <p:txBody>
-          <a:bodyPr>
-            <a:spAutoFit/>
-          </a:bodyPr>
-          <a:lstStyle/>
-          <a:p>
-            <a:r>
-              <a:rPr lang="en-US" i="1" dirty="0" smtClean="0">
-                <a:solidFill>
-                  <a:srgbClr val="222222"/>
-                </a:solidFill>
-                <a:latin typeface="Arial" panose="020B0604020202020204" pitchFamily="34" charset="0"/>
-              </a:rPr>
-              <a:t>“The </a:t>
-            </a:r>
-            <a:r>
-              <a:rPr lang="en-US" i="1" dirty="0">
-                <a:solidFill>
-                  <a:srgbClr val="222222"/>
-                </a:solidFill>
-                <a:latin typeface="Arial" panose="020B0604020202020204" pitchFamily="34" charset="0"/>
-              </a:rPr>
-              <a:t>model enclosed is the earliest I have in my files, so it may not duplicate what is in my paper</a:t>
-            </a:r>
-            <a:r>
-              <a:rPr lang="en-US" i="1" dirty="0" smtClean="0">
-                <a:solidFill>
-                  <a:srgbClr val="222222"/>
-                </a:solidFill>
-                <a:latin typeface="Arial" panose="020B0604020202020204" pitchFamily="34" charset="0"/>
-              </a:rPr>
-              <a:t>.”</a:t>
-            </a:r>
-          </a:p>
-          <a:p>
-            <a:endParaRPr lang="en-US" i="1" dirty="0" smtClean="0">
-              <a:solidFill>
-                <a:srgbClr val="222222"/>
-              </a:solidFill>
-              <a:latin typeface="Arial" panose="020B0604020202020204" pitchFamily="34" charset="0"/>
-            </a:endParaRPr>
-          </a:p>
-          <a:p>
-            <a:pPr algn="r"/>
-            <a:r>
-              <a:rPr lang="en-US" i="1" dirty="0" smtClean="0">
-                <a:solidFill>
-                  <a:srgbClr val="222222"/>
-                </a:solidFill>
-                <a:latin typeface="Arial" panose="020B0604020202020204" pitchFamily="34" charset="0"/>
-              </a:rPr>
-              <a:t>Undisclosed author, 01/05/2022</a:t>
-            </a:r>
-            <a:endParaRPr lang="en-US" i="1" dirty="0">
-              <a:solidFill>
-                <a:srgbClr val="222222"/>
-              </a:solidFill>
-              <a:latin typeface="Arial" panose="020B0604020202020204" pitchFamily="34" charset="0"/>
-            </a:endParaRPr>
-          </a:p>
-        </p:txBody>
-      </p:sp>
-    </p:spTree>
-    <p:extLst>
-      <p:ext uri="{BB962C8B-B14F-4D97-AF65-F5344CB8AC3E}">
-        <p14:creationId xmlns:p14="http://schemas.microsoft.com/office/powerpoint/2010/main" val="38010002"/>
-      </p:ext>
-    </p:extLst>
-  </p:cSld>
-  <p:clrMapOvr>
-    <a:masterClrMapping/>
-  </p:clrMapOvr>
-  <p:timing>
-    <p:tnLst>
-      <p:par>
-        <p:cTn id="1" dur="indefinite" restart="never" nodeType="tmRoot"/>
-      </p:par>
-    </p:tnLst>
-  </p:timing>
 </p:sld>
 </file>
 

</xml_diff>